<commit_message>
update day 62 and 63 slides
</commit_message>
<xml_diff>
--- a/_PowerPoints/2nd Semester/Unit 7 ACT/Algebra4_Day_062 Math Mini Test.pptx
+++ b/_PowerPoints/2nd Semester/Unit 7 ACT/Algebra4_Day_062 Math Mini Test.pptx
@@ -223,7 +223,7 @@
           <a:p>
             <a:fld id="{FAC4242D-6570-4D26-878C-5DE8AD62D39F}" type="datetimeFigureOut">
               <a:rPr lang="en-US" smtClean="0"/>
-              <a:t>3/19/2018</a:t>
+              <a:t>3/21/2018</a:t>
             </a:fld>
             <a:endParaRPr lang="en-US"/>
           </a:p>
@@ -476,7 +476,7 @@
             <a:fld id="{87DE6118-2437-4B30-8E3C-4D2BE6020583}" type="datetimeFigureOut">
               <a:rPr lang="en-US" dirty="0"/>
               <a:pPr/>
-              <a:t>3/19/2018</a:t>
+              <a:t>3/21/2018</a:t>
             </a:fld>
             <a:endParaRPr lang="en-US" dirty="0"/>
           </a:p>
@@ -802,7 +802,7 @@
           <a:p>
             <a:fld id="{87DE6118-2437-4B30-8E3C-4D2BE6020583}" type="datetimeFigureOut">
               <a:rPr lang="en-US" dirty="0"/>
-              <a:t>3/19/2018</a:t>
+              <a:t>3/21/2018</a:t>
             </a:fld>
             <a:endParaRPr lang="en-US" dirty="0"/>
           </a:p>
@@ -977,7 +977,7 @@
           <a:p>
             <a:fld id="{87DE6118-2437-4B30-8E3C-4D2BE6020583}" type="datetimeFigureOut">
               <a:rPr lang="en-US" dirty="0"/>
-              <a:t>3/19/2018</a:t>
+              <a:t>3/21/2018</a:t>
             </a:fld>
             <a:endParaRPr lang="en-US" dirty="0"/>
           </a:p>
@@ -1142,7 +1142,7 @@
           <a:p>
             <a:fld id="{87DE6118-2437-4B30-8E3C-4D2BE6020583}" type="datetimeFigureOut">
               <a:rPr lang="en-US" dirty="0"/>
-              <a:t>3/19/2018</a:t>
+              <a:t>3/21/2018</a:t>
             </a:fld>
             <a:endParaRPr lang="en-US" dirty="0"/>
           </a:p>
@@ -1415,7 +1415,7 @@
             <a:fld id="{87DE6118-2437-4B30-8E3C-4D2BE6020583}" type="datetimeFigureOut">
               <a:rPr lang="en-US" dirty="0"/>
               <a:pPr/>
-              <a:t>3/19/2018</a:t>
+              <a:t>3/21/2018</a:t>
             </a:fld>
             <a:endParaRPr lang="en-US" dirty="0"/>
           </a:p>
@@ -1805,7 +1805,7 @@
           <a:p>
             <a:fld id="{87DE6118-2437-4B30-8E3C-4D2BE6020583}" type="datetimeFigureOut">
               <a:rPr lang="en-US" dirty="0"/>
-              <a:t>3/19/2018</a:t>
+              <a:t>3/21/2018</a:t>
             </a:fld>
             <a:endParaRPr lang="en-US" dirty="0"/>
           </a:p>
@@ -2277,7 +2277,7 @@
           <a:p>
             <a:fld id="{87DE6118-2437-4B30-8E3C-4D2BE6020583}" type="datetimeFigureOut">
               <a:rPr lang="en-US" dirty="0"/>
-              <a:t>3/19/2018</a:t>
+              <a:t>3/21/2018</a:t>
             </a:fld>
             <a:endParaRPr lang="en-US" dirty="0"/>
           </a:p>
@@ -2390,7 +2390,7 @@
           <a:p>
             <a:fld id="{87DE6118-2437-4B30-8E3C-4D2BE6020583}" type="datetimeFigureOut">
               <a:rPr lang="en-US" dirty="0"/>
-              <a:t>3/19/2018</a:t>
+              <a:t>3/21/2018</a:t>
             </a:fld>
             <a:endParaRPr lang="en-US" dirty="0"/>
           </a:p>
@@ -2480,7 +2480,7 @@
           <a:p>
             <a:fld id="{87DE6118-2437-4B30-8E3C-4D2BE6020583}" type="datetimeFigureOut">
               <a:rPr lang="en-US" dirty="0"/>
-              <a:t>3/19/2018</a:t>
+              <a:t>3/21/2018</a:t>
             </a:fld>
             <a:endParaRPr lang="en-US" dirty="0"/>
           </a:p>
@@ -2822,7 +2822,7 @@
             <a:fld id="{87DE6118-2437-4B30-8E3C-4D2BE6020583}" type="datetimeFigureOut">
               <a:rPr lang="en-US" dirty="0"/>
               <a:pPr/>
-              <a:t>3/19/2018</a:t>
+              <a:t>3/21/2018</a:t>
             </a:fld>
             <a:endParaRPr lang="en-US" dirty="0"/>
           </a:p>
@@ -3207,7 +3207,7 @@
             <a:fld id="{87DE6118-2437-4B30-8E3C-4D2BE6020583}" type="datetimeFigureOut">
               <a:rPr lang="en-US" dirty="0"/>
               <a:pPr/>
-              <a:t>3/19/2018</a:t>
+              <a:t>3/21/2018</a:t>
             </a:fld>
             <a:endParaRPr lang="en-US" dirty="0"/>
           </a:p>
@@ -3482,7 +3482,7 @@
             <a:fld id="{87DE6118-2437-4B30-8E3C-4D2BE6020583}" type="datetimeFigureOut">
               <a:rPr lang="en-US" dirty="0"/>
               <a:pPr/>
-              <a:t>3/19/2018</a:t>
+              <a:t>3/21/2018</a:t>
             </a:fld>
             <a:endParaRPr lang="en-US" dirty="0"/>
           </a:p>
@@ -4030,11 +4030,7 @@
           <a:p>
             <a:r>
               <a:rPr lang="en-US" dirty="0" smtClean="0"/>
-              <a:t>Day </a:t>
-            </a:r>
-            <a:r>
-              <a:rPr lang="en-US" dirty="0" smtClean="0"/>
-              <a:t>62</a:t>
+              <a:t>Day 62</a:t>
             </a:r>
             <a:endParaRPr lang="en-US" dirty="0"/>
           </a:p>
@@ -4117,6 +4113,13 @@
   <p:clrMapOvr>
     <a:masterClrMapping/>
   </p:clrMapOvr>
+  <p:timing>
+    <p:tnLst>
+      <p:par>
+        <p:cTn id="1" dur="indefinite" restart="never" nodeType="tmRoot"/>
+      </p:par>
+    </p:tnLst>
+  </p:timing>
 </p:sld>
 </file>
 
@@ -4308,7 +4311,6 @@
               <a:rPr lang="en-US" sz="3400" dirty="0"/>
               <a:t>Complex numbers</a:t>
             </a:r>
-            <a:endParaRPr lang="en-US" sz="3400" dirty="0"/>
           </a:p>
         </p:txBody>
       </p:sp>
@@ -4322,6 +4324,13 @@
   <p:clrMapOvr>
     <a:masterClrMapping/>
   </p:clrMapOvr>
+  <p:timing>
+    <p:tnLst>
+      <p:par>
+        <p:cTn id="1" dur="indefinite" restart="never" nodeType="tmRoot"/>
+      </p:par>
+    </p:tnLst>
+  </p:timing>
 </p:sld>
 </file>
 
@@ -4382,6 +4391,13 @@
   <p:clrMapOvr>
     <a:masterClrMapping/>
   </p:clrMapOvr>
+  <p:timing>
+    <p:tnLst>
+      <p:par>
+        <p:cTn id="1" dur="indefinite" restart="never" nodeType="tmRoot"/>
+      </p:par>
+    </p:tnLst>
+  </p:timing>
 </p:sld>
 </file>
 
@@ -4442,6 +4458,13 @@
   <p:clrMapOvr>
     <a:masterClrMapping/>
   </p:clrMapOvr>
+  <p:timing>
+    <p:tnLst>
+      <p:par>
+        <p:cTn id="1" dur="indefinite" restart="never" nodeType="tmRoot"/>
+      </p:par>
+    </p:tnLst>
+  </p:timing>
 </p:sld>
 </file>
 
@@ -4577,6 +4600,13 @@
   <p:clrMapOvr>
     <a:masterClrMapping/>
   </p:clrMapOvr>
+  <p:timing>
+    <p:tnLst>
+      <p:par>
+        <p:cTn id="1" dur="indefinite" restart="never" nodeType="tmRoot"/>
+      </p:par>
+    </p:tnLst>
+  </p:timing>
 </p:sld>
 </file>
 
@@ -4637,6 +4667,13 @@
   <p:clrMapOvr>
     <a:masterClrMapping/>
   </p:clrMapOvr>
+  <p:timing>
+    <p:tnLst>
+      <p:par>
+        <p:cTn id="1" dur="indefinite" restart="never" nodeType="tmRoot"/>
+      </p:par>
+    </p:tnLst>
+  </p:timing>
 </p:sld>
 </file>
 
@@ -4765,6 +4802,13 @@
   <p:clrMapOvr>
     <a:masterClrMapping/>
   </p:clrMapOvr>
+  <p:timing>
+    <p:tnLst>
+      <p:par>
+        <p:cTn id="1" dur="indefinite" restart="never" nodeType="tmRoot"/>
+      </p:par>
+    </p:tnLst>
+  </p:timing>
 </p:sld>
 </file>
 
@@ -4825,6 +4869,13 @@
   <p:clrMapOvr>
     <a:masterClrMapping/>
   </p:clrMapOvr>
+  <p:timing>
+    <p:tnLst>
+      <p:par>
+        <p:cTn id="1" dur="indefinite" restart="never" nodeType="tmRoot"/>
+      </p:par>
+    </p:tnLst>
+  </p:timing>
 </p:sld>
 </file>
 
@@ -4953,6 +5004,13 @@
   <p:clrMapOvr>
     <a:masterClrMapping/>
   </p:clrMapOvr>
+  <p:timing>
+    <p:tnLst>
+      <p:par>
+        <p:cTn id="1" dur="indefinite" restart="never" nodeType="tmRoot"/>
+      </p:par>
+    </p:tnLst>
+  </p:timing>
 </p:sld>
 </file>
 
@@ -5013,6 +5071,13 @@
   <p:clrMapOvr>
     <a:masterClrMapping/>
   </p:clrMapOvr>
+  <p:timing>
+    <p:tnLst>
+      <p:par>
+        <p:cTn id="1" dur="indefinite" restart="never" nodeType="tmRoot"/>
+      </p:par>
+    </p:tnLst>
+  </p:timing>
 </p:sld>
 </file>
 
@@ -5050,11 +5115,7 @@
           <a:p>
             <a:r>
               <a:rPr lang="en-US" dirty="0" smtClean="0"/>
-              <a:t>ACT DAY </a:t>
-            </a:r>
-            <a:r>
-              <a:rPr lang="en-US" dirty="0" smtClean="0"/>
-              <a:t>2</a:t>
+              <a:t>ACT DAY 2</a:t>
             </a:r>
             <a:endParaRPr lang="en-US" dirty="0"/>
           </a:p>
@@ -5089,42 +5150,45 @@
               <a:rPr lang="en-US" sz="3400" dirty="0" smtClean="0"/>
               <a:t>ACT Prep Guidelines</a:t>
             </a:r>
-            <a:endParaRPr lang="en-US" sz="3400" dirty="0" smtClean="0"/>
           </a:p>
           <a:p>
             <a:r>
               <a:rPr lang="en-US" sz="3400" dirty="0" smtClean="0"/>
               <a:t>Math Mini Test 1</a:t>
             </a:r>
+          </a:p>
+          <a:p>
+            <a:r>
+              <a:rPr lang="en-US" sz="3400" dirty="0" smtClean="0"/>
+              <a:t>Go </a:t>
+            </a:r>
+            <a:r>
+              <a:rPr lang="en-US" sz="3400" dirty="0" smtClean="0"/>
+              <a:t>Over Mini </a:t>
+            </a:r>
+            <a:r>
+              <a:rPr lang="en-US" sz="3400" dirty="0" smtClean="0"/>
+              <a:t>Test</a:t>
+            </a:r>
             <a:endParaRPr lang="en-US" sz="3400" dirty="0" smtClean="0"/>
           </a:p>
           <a:p>
             <a:r>
               <a:rPr lang="en-US" sz="3400" dirty="0" smtClean="0"/>
-              <a:t>Math Mini Test 2</a:t>
-            </a:r>
-          </a:p>
-          <a:p>
+              <a:t>Mini Test </a:t>
+            </a:r>
             <a:r>
               <a:rPr lang="en-US" sz="3400" dirty="0" smtClean="0"/>
-              <a:t>Go Over Mini Tests</a:t>
-            </a:r>
-            <a:endParaRPr lang="en-US" sz="3400" dirty="0" smtClean="0"/>
-          </a:p>
-          <a:p>
+              <a:t>2 </a:t>
+            </a:r>
             <a:r>
               <a:rPr lang="en-US" sz="3400" dirty="0" smtClean="0"/>
-              <a:t>Mini </a:t>
+              <a:t>(in </a:t>
             </a:r>
             <a:r>
               <a:rPr lang="en-US" sz="3400" dirty="0" smtClean="0"/>
-              <a:t>Test </a:t>
-            </a:r>
-            <a:r>
-              <a:rPr lang="en-US" sz="3400" dirty="0" smtClean="0"/>
-              <a:t>3 (in class/take home)</a:t>
-            </a:r>
-            <a:endParaRPr lang="en-US" sz="3400" dirty="0" smtClean="0"/>
+              <a:t>class/take home)</a:t>
+            </a:r>
           </a:p>
           <a:p>
             <a:endParaRPr lang="en-US" sz="3400" dirty="0"/>
@@ -5141,6 +5205,13 @@
   <p:clrMapOvr>
     <a:masterClrMapping/>
   </p:clrMapOvr>
+  <p:timing>
+    <p:tnLst>
+      <p:par>
+        <p:cTn id="1" dur="indefinite" restart="never" nodeType="tmRoot"/>
+      </p:par>
+    </p:tnLst>
+  </p:timing>
 </p:sld>
 </file>
 
@@ -5389,6 +5460,13 @@
   <p:clrMapOvr>
     <a:masterClrMapping/>
   </p:clrMapOvr>
+  <p:timing>
+    <p:tnLst>
+      <p:par>
+        <p:cTn id="1" dur="indefinite" restart="never" nodeType="tmRoot"/>
+      </p:par>
+    </p:tnLst>
+  </p:timing>
 </p:sld>
 </file>
 
@@ -5484,6 +5562,13 @@
   <p:clrMapOvr>
     <a:masterClrMapping/>
   </p:clrMapOvr>
+  <p:timing>
+    <p:tnLst>
+      <p:par>
+        <p:cTn id="1" dur="indefinite" restart="never" nodeType="tmRoot"/>
+      </p:par>
+    </p:tnLst>
+  </p:timing>
 </p:sld>
 </file>
 
@@ -5614,7 +5699,11 @@
             </a:r>
             <a:r>
               <a:rPr lang="en-US" dirty="0" smtClean="0"/>
-              <a:t>2</a:t>
+              <a:t>2 (</a:t>
+            </a:r>
+            <a:r>
+              <a:rPr lang="en-US" smtClean="0"/>
+              <a:t>in class/homework)</a:t>
             </a:r>
             <a:endParaRPr lang="en-US" dirty="0"/>
           </a:p>
@@ -6047,6 +6136,13 @@
   <p:clrMapOvr>
     <a:masterClrMapping/>
   </p:clrMapOvr>
+  <p:timing>
+    <p:tnLst>
+      <p:par>
+        <p:cTn id="1" dur="indefinite" restart="never" nodeType="tmRoot"/>
+      </p:par>
+    </p:tnLst>
+  </p:timing>
 </p:sld>
 </file>
 
@@ -6159,6 +6255,13 @@
   <p:clrMapOvr>
     <a:masterClrMapping/>
   </p:clrMapOvr>
+  <p:timing>
+    <p:tnLst>
+      <p:par>
+        <p:cTn id="1" dur="indefinite" restart="never" nodeType="tmRoot"/>
+      </p:par>
+    </p:tnLst>
+  </p:timing>
 </p:sld>
 </file>
 
@@ -6386,7 +6489,6 @@
               <a:rPr lang="en-US" sz="3000" dirty="0"/>
               <a:t>Understanding simple descriptive statistics</a:t>
             </a:r>
-            <a:endParaRPr lang="en-US" sz="3000" dirty="0"/>
           </a:p>
         </p:txBody>
       </p:sp>
@@ -6400,6 +6502,13 @@
   <p:clrMapOvr>
     <a:masterClrMapping/>
   </p:clrMapOvr>
+  <p:timing>
+    <p:tnLst>
+      <p:par>
+        <p:cTn id="1" dur="indefinite" restart="never" nodeType="tmRoot"/>
+      </p:par>
+    </p:tnLst>
+  </p:timing>
 </p:sld>
 </file>
 
@@ -6460,6 +6569,13 @@
   <p:clrMapOvr>
     <a:masterClrMapping/>
   </p:clrMapOvr>
+  <p:timing>
+    <p:tnLst>
+      <p:par>
+        <p:cTn id="1" dur="indefinite" restart="never" nodeType="tmRoot"/>
+      </p:par>
+    </p:tnLst>
+  </p:timing>
 </p:sld>
 </file>
 
@@ -6520,6 +6636,13 @@
   <p:clrMapOvr>
     <a:masterClrMapping/>
   </p:clrMapOvr>
+  <p:timing>
+    <p:tnLst>
+      <p:par>
+        <p:cTn id="1" dur="indefinite" restart="never" nodeType="tmRoot"/>
+      </p:par>
+    </p:tnLst>
+  </p:timing>
 </p:sld>
 </file>
 
@@ -6645,6 +6768,13 @@
   <p:clrMapOvr>
     <a:masterClrMapping/>
   </p:clrMapOvr>
+  <p:timing>
+    <p:tnLst>
+      <p:par>
+        <p:cTn id="1" dur="indefinite" restart="never" nodeType="tmRoot"/>
+      </p:par>
+    </p:tnLst>
+  </p:timing>
 </p:sld>
 </file>
 
@@ -6705,6 +6835,13 @@
   <p:clrMapOvr>
     <a:masterClrMapping/>
   </p:clrMapOvr>
+  <p:timing>
+    <p:tnLst>
+      <p:par>
+        <p:cTn id="1" dur="indefinite" restart="never" nodeType="tmRoot"/>
+      </p:par>
+    </p:tnLst>
+  </p:timing>
 </p:sld>
 </file>
 

</xml_diff>